<commit_message>
feat: Source Code Agents
</commit_message>
<xml_diff>
--- a/docs/Slide.pptx
+++ b/docs/Slide.pptx
@@ -2802,7 +2802,7 @@
                 <a:lumOff val="80000"/>
               </a:schemeClr>
             </a:gs>
-            <a:gs pos="28000">
+            <a:gs pos="13000">
               <a:schemeClr val="accent1">
                 <a:lumMod val="20000"/>
                 <a:lumOff val="80000"/>
@@ -3612,6 +3612,45 @@
           </a:p>
         </p:txBody>
       </p:sp>
+      <p:sp>
+        <p:nvSpPr>
+          <p:cNvPr id="4" name="Marcador de contenido 3">
+            <a:extLst>
+              <a:ext uri="{FF2B5EF4-FFF2-40B4-BE49-F238E27FC236}">
+                <a16:creationId xmlns:a16="http://schemas.microsoft.com/office/drawing/2014/main" id="{341422D5-B491-4096-91E8-FC2A9CC0BF27}"/>
+              </a:ext>
+            </a:extLst>
+          </p:cNvPr>
+          <p:cNvSpPr>
+            <a:spLocks noGrp="1"/>
+          </p:cNvSpPr>
+          <p:nvPr>
+            <p:ph idx="1"/>
+          </p:nvPr>
+        </p:nvSpPr>
+        <p:spPr>
+          <a:xfrm>
+            <a:off x="838200" y="1825625"/>
+            <a:ext cx="4360025" cy="1773786"/>
+          </a:xfrm>
+        </p:spPr>
+        <p:txBody>
+          <a:bodyPr>
+            <a:normAutofit/>
+          </a:bodyPr>
+          <a:lstStyle/>
+          <a:p>
+            <a:pPr marL="0" indent="0">
+              <a:buNone/>
+            </a:pPr>
+            <a:r>
+              <a:rPr lang="es-MX" sz="1600" dirty="0"/>
+              <a:t>El agente genera preguntas relacionadas con el tema que está estudiando el usuario, ayudando a reforzar su comprensión y promoviendo la interactividad durante el proceso de aprendizaje.</a:t>
+            </a:r>
+            <a:endParaRPr lang="es-CO" sz="1600" dirty="0"/>
+          </a:p>
+        </p:txBody>
+      </p:sp>
       <p:pic>
         <p:nvPicPr>
           <p:cNvPr id="7" name="Picture 6" descr="Microsoft | Microsoft Wiki | Fandom">
@@ -3706,45 +3745,6 @@
           </a:extLst>
         </p:spPr>
       </p:pic>
-      <p:sp>
-        <p:nvSpPr>
-          <p:cNvPr id="4" name="Marcador de contenido 3">
-            <a:extLst>
-              <a:ext uri="{FF2B5EF4-FFF2-40B4-BE49-F238E27FC236}">
-                <a16:creationId xmlns:a16="http://schemas.microsoft.com/office/drawing/2014/main" id="{341422D5-B491-4096-91E8-FC2A9CC0BF27}"/>
-              </a:ext>
-            </a:extLst>
-          </p:cNvPr>
-          <p:cNvSpPr>
-            <a:spLocks noGrp="1"/>
-          </p:cNvSpPr>
-          <p:nvPr>
-            <p:ph idx="1"/>
-          </p:nvPr>
-        </p:nvSpPr>
-        <p:spPr>
-          <a:xfrm>
-            <a:off x="838200" y="1825625"/>
-            <a:ext cx="4360025" cy="1773786"/>
-          </a:xfrm>
-        </p:spPr>
-        <p:txBody>
-          <a:bodyPr>
-            <a:normAutofit/>
-          </a:bodyPr>
-          <a:lstStyle/>
-          <a:p>
-            <a:pPr marL="0" indent="0">
-              <a:buNone/>
-            </a:pPr>
-            <a:r>
-              <a:rPr lang="es-MX" sz="1600" dirty="0"/>
-              <a:t>El agente genera preguntas relacionadas con el tema que está estudiando el usuario, ayudando a reforzar su comprensión y promoviendo la interactividad durante el proceso de aprendizaje.</a:t>
-            </a:r>
-            <a:endParaRPr lang="es-CO" sz="1600" dirty="0"/>
-          </a:p>
-        </p:txBody>
-      </p:sp>
       <p:pic>
         <p:nvPicPr>
           <p:cNvPr id="9" name="Marcador de contenido 4">
@@ -3809,7 +3809,7 @@
           </a:bodyPr>
           <a:lstStyle/>
           <a:p>
-            <a:pPr marL="285750" indent="-285750">
+            <a:pPr marL="285750" indent="-285750" algn="just">
               <a:buFont typeface="Arial" panose="020B0604020202020204" pitchFamily="34" charset="0"/>
               <a:buChar char="•"/>
             </a:pPr>
@@ -3823,14 +3823,14 @@
             </a:r>
           </a:p>
           <a:p>
-            <a:pPr marL="285750" indent="-285750">
+            <a:pPr marL="285750" indent="-285750" algn="just">
               <a:buFont typeface="Arial" panose="020B0604020202020204" pitchFamily="34" charset="0"/>
               <a:buChar char="•"/>
             </a:pPr>
             <a:endParaRPr lang="es-CO" sz="1600" dirty="0"/>
           </a:p>
           <a:p>
-            <a:pPr marL="285750" indent="-285750">
+            <a:pPr marL="285750" indent="-285750" algn="just">
               <a:buFont typeface="Arial" panose="020B0604020202020204" pitchFamily="34" charset="0"/>
               <a:buChar char="•"/>
             </a:pPr>
@@ -3848,14 +3848,14 @@
             </a:r>
           </a:p>
           <a:p>
-            <a:pPr marL="285750" indent="-285750">
+            <a:pPr marL="285750" indent="-285750" algn="just">
               <a:buFont typeface="Arial" panose="020B0604020202020204" pitchFamily="34" charset="0"/>
               <a:buChar char="•"/>
             </a:pPr>
             <a:endParaRPr lang="es-CO" sz="1600" dirty="0"/>
           </a:p>
           <a:p>
-            <a:pPr marL="285750" indent="-285750">
+            <a:pPr marL="285750" indent="-285750" algn="just">
               <a:buFont typeface="Arial" panose="020B0604020202020204" pitchFamily="34" charset="0"/>
               <a:buChar char="•"/>
             </a:pPr>
@@ -3904,6 +3904,42 @@
           <a:chExt cx="0" cy="0"/>
         </a:xfrm>
       </p:grpSpPr>
+      <p:pic>
+        <p:nvPicPr>
+          <p:cNvPr id="11" name="Marcador de contenido 4">
+            <a:extLst>
+              <a:ext uri="{FF2B5EF4-FFF2-40B4-BE49-F238E27FC236}">
+                <a16:creationId xmlns:a16="http://schemas.microsoft.com/office/drawing/2014/main" id="{1E7A5A94-3295-420C-B473-C2FA4ECBA141}"/>
+              </a:ext>
+            </a:extLst>
+          </p:cNvPr>
+          <p:cNvPicPr>
+            <a:picLocks noChangeAspect="1"/>
+          </p:cNvPicPr>
+          <p:nvPr/>
+        </p:nvPicPr>
+        <p:blipFill>
+          <a:blip r:embed="rId2">
+            <a:extLst>
+              <a:ext uri="{28A0092B-C50C-407E-A947-70E740481C1C}">
+                <a14:useLocalDpi xmlns:a14="http://schemas.microsoft.com/office/drawing/2010/main" val="0"/>
+              </a:ext>
+            </a:extLst>
+          </a:blip>
+          <a:stretch>
+            <a:fillRect/>
+          </a:stretch>
+        </p:blipFill>
+        <p:spPr>
+          <a:xfrm>
+            <a:off x="4798690" y="1825625"/>
+            <a:ext cx="2594619" cy="2583578"/>
+          </a:xfrm>
+          <a:prstGeom prst="rect">
+            <a:avLst/>
+          </a:prstGeom>
+        </p:spPr>
+      </p:pic>
       <p:sp>
         <p:nvSpPr>
           <p:cNvPr id="2" name="Título 1">
@@ -3932,6 +3968,45 @@
           </a:p>
         </p:txBody>
       </p:sp>
+      <p:sp>
+        <p:nvSpPr>
+          <p:cNvPr id="4" name="Marcador de contenido 3">
+            <a:extLst>
+              <a:ext uri="{FF2B5EF4-FFF2-40B4-BE49-F238E27FC236}">
+                <a16:creationId xmlns:a16="http://schemas.microsoft.com/office/drawing/2014/main" id="{341422D5-B491-4096-91E8-FC2A9CC0BF27}"/>
+              </a:ext>
+            </a:extLst>
+          </p:cNvPr>
+          <p:cNvSpPr>
+            <a:spLocks noGrp="1"/>
+          </p:cNvSpPr>
+          <p:nvPr>
+            <p:ph idx="1"/>
+          </p:nvPr>
+        </p:nvSpPr>
+        <p:spPr>
+          <a:xfrm>
+            <a:off x="838200" y="1825625"/>
+            <a:ext cx="4360025" cy="1773786"/>
+          </a:xfrm>
+        </p:spPr>
+        <p:txBody>
+          <a:bodyPr>
+            <a:normAutofit/>
+          </a:bodyPr>
+          <a:lstStyle/>
+          <a:p>
+            <a:pPr marL="0" indent="0" algn="just">
+              <a:buNone/>
+            </a:pPr>
+            <a:r>
+              <a:rPr lang="es-MX" sz="1600" dirty="0"/>
+              <a:t>El agente genera contenido relacionado con el tema que está estudiando, adaptando la información de forma precisa y relevante para apoyar el proceso de aprendizaje.</a:t>
+            </a:r>
+            <a:endParaRPr lang="es-CO" sz="1600" dirty="0"/>
+          </a:p>
+        </p:txBody>
+      </p:sp>
       <p:pic>
         <p:nvPicPr>
           <p:cNvPr id="7" name="Picture 6" descr="Microsoft | Microsoft Wiki | Fandom">
@@ -3947,7 +4022,7 @@
           <p:nvPr/>
         </p:nvPicPr>
         <p:blipFill>
-          <a:blip r:embed="rId2">
+          <a:blip r:embed="rId3">
             <a:extLst>
               <a:ext uri="{28A0092B-C50C-407E-A947-70E740481C1C}">
                 <a14:useLocalDpi xmlns:a14="http://schemas.microsoft.com/office/drawing/2010/main" val="0"/>
@@ -3994,7 +4069,7 @@
           <p:nvPr/>
         </p:nvPicPr>
         <p:blipFill>
-          <a:blip r:embed="rId3">
+          <a:blip r:embed="rId4">
             <a:extLst>
               <a:ext uri="{28A0092B-C50C-407E-A947-70E740481C1C}">
                 <a14:useLocalDpi xmlns:a14="http://schemas.microsoft.com/office/drawing/2010/main" val="0"/>
@@ -4028,45 +4103,6 @@
       </p:pic>
       <p:sp>
         <p:nvSpPr>
-          <p:cNvPr id="4" name="Marcador de contenido 3">
-            <a:extLst>
-              <a:ext uri="{FF2B5EF4-FFF2-40B4-BE49-F238E27FC236}">
-                <a16:creationId xmlns:a16="http://schemas.microsoft.com/office/drawing/2014/main" id="{341422D5-B491-4096-91E8-FC2A9CC0BF27}"/>
-              </a:ext>
-            </a:extLst>
-          </p:cNvPr>
-          <p:cNvSpPr>
-            <a:spLocks noGrp="1"/>
-          </p:cNvSpPr>
-          <p:nvPr>
-            <p:ph idx="1"/>
-          </p:nvPr>
-        </p:nvSpPr>
-        <p:spPr>
-          <a:xfrm>
-            <a:off x="838200" y="1825625"/>
-            <a:ext cx="4360025" cy="1773786"/>
-          </a:xfrm>
-        </p:spPr>
-        <p:txBody>
-          <a:bodyPr>
-            <a:normAutofit/>
-          </a:bodyPr>
-          <a:lstStyle/>
-          <a:p>
-            <a:pPr marL="0" indent="0">
-              <a:buNone/>
-            </a:pPr>
-            <a:r>
-              <a:rPr lang="es-MX" sz="1600" dirty="0"/>
-              <a:t>El agente genera contenido relacionado con el tema que está estudiando, adaptando la información de forma precisa y relevante para apoyar el proceso de aprendizaje.</a:t>
-            </a:r>
-            <a:endParaRPr lang="es-CO" sz="1600" dirty="0"/>
-          </a:p>
-        </p:txBody>
-      </p:sp>
-      <p:sp>
-        <p:nvSpPr>
           <p:cNvPr id="10" name="CuadroTexto 9">
             <a:extLst>
               <a:ext uri="{FF2B5EF4-FFF2-40B4-BE49-F238E27FC236}">
@@ -4093,7 +4129,7 @@
           </a:bodyPr>
           <a:lstStyle/>
           <a:p>
-            <a:pPr marL="285750" indent="-285750">
+            <a:pPr marL="285750" indent="-285750" algn="just">
               <a:buFont typeface="Arial" panose="020B0604020202020204" pitchFamily="34" charset="0"/>
               <a:buChar char="•"/>
             </a:pPr>
@@ -4107,14 +4143,14 @@
             </a:r>
           </a:p>
           <a:p>
-            <a:pPr marL="285750" indent="-285750">
+            <a:pPr marL="285750" indent="-285750" algn="just">
               <a:buFont typeface="Arial" panose="020B0604020202020204" pitchFamily="34" charset="0"/>
               <a:buChar char="•"/>
             </a:pPr>
             <a:endParaRPr lang="es-MX" sz="1600" dirty="0"/>
           </a:p>
           <a:p>
-            <a:pPr marL="285750" indent="-285750">
+            <a:pPr marL="285750" indent="-285750" algn="just">
               <a:buFont typeface="Arial" panose="020B0604020202020204" pitchFamily="34" charset="0"/>
               <a:buChar char="•"/>
             </a:pPr>
@@ -4128,14 +4164,14 @@
             </a:r>
           </a:p>
           <a:p>
-            <a:pPr marL="285750" indent="-285750">
+            <a:pPr marL="285750" indent="-285750" algn="just">
               <a:buFont typeface="Arial" panose="020B0604020202020204" pitchFamily="34" charset="0"/>
               <a:buChar char="•"/>
             </a:pPr>
             <a:endParaRPr lang="es-MX" sz="1600" dirty="0"/>
           </a:p>
           <a:p>
-            <a:pPr marL="285750" indent="-285750">
+            <a:pPr marL="285750" indent="-285750" algn="just">
               <a:buFont typeface="Arial" panose="020B0604020202020204" pitchFamily="34" charset="0"/>
               <a:buChar char="•"/>
             </a:pPr>
@@ -4151,42 +4187,6 @@
           </a:p>
         </p:txBody>
       </p:sp>
-      <p:pic>
-        <p:nvPicPr>
-          <p:cNvPr id="11" name="Marcador de contenido 4">
-            <a:extLst>
-              <a:ext uri="{FF2B5EF4-FFF2-40B4-BE49-F238E27FC236}">
-                <a16:creationId xmlns:a16="http://schemas.microsoft.com/office/drawing/2014/main" id="{1E7A5A94-3295-420C-B473-C2FA4ECBA141}"/>
-              </a:ext>
-            </a:extLst>
-          </p:cNvPr>
-          <p:cNvPicPr>
-            <a:picLocks noChangeAspect="1"/>
-          </p:cNvPicPr>
-          <p:nvPr/>
-        </p:nvPicPr>
-        <p:blipFill>
-          <a:blip r:embed="rId4">
-            <a:extLst>
-              <a:ext uri="{28A0092B-C50C-407E-A947-70E740481C1C}">
-                <a14:useLocalDpi xmlns:a14="http://schemas.microsoft.com/office/drawing/2010/main" val="0"/>
-              </a:ext>
-            </a:extLst>
-          </a:blip>
-          <a:stretch>
-            <a:fillRect/>
-          </a:stretch>
-        </p:blipFill>
-        <p:spPr>
-          <a:xfrm>
-            <a:off x="4798690" y="1825625"/>
-            <a:ext cx="2594619" cy="2583578"/>
-          </a:xfrm>
-          <a:prstGeom prst="rect">
-            <a:avLst/>
-          </a:prstGeom>
-        </p:spPr>
-      </p:pic>
     </p:spTree>
     <p:extLst>
       <p:ext uri="{BB962C8B-B14F-4D97-AF65-F5344CB8AC3E}">
@@ -4217,6 +4217,42 @@
           <a:chExt cx="0" cy="0"/>
         </a:xfrm>
       </p:grpSpPr>
+      <p:pic>
+        <p:nvPicPr>
+          <p:cNvPr id="9" name="Marcador de contenido 4">
+            <a:extLst>
+              <a:ext uri="{FF2B5EF4-FFF2-40B4-BE49-F238E27FC236}">
+                <a16:creationId xmlns:a16="http://schemas.microsoft.com/office/drawing/2014/main" id="{38970A53-BB1C-4624-AD0F-E10D487662ED}"/>
+              </a:ext>
+            </a:extLst>
+          </p:cNvPr>
+          <p:cNvPicPr>
+            <a:picLocks noChangeAspect="1"/>
+          </p:cNvPicPr>
+          <p:nvPr/>
+        </p:nvPicPr>
+        <p:blipFill>
+          <a:blip r:embed="rId2">
+            <a:extLst>
+              <a:ext uri="{28A0092B-C50C-407E-A947-70E740481C1C}">
+                <a14:useLocalDpi xmlns:a14="http://schemas.microsoft.com/office/drawing/2010/main" val="0"/>
+              </a:ext>
+            </a:extLst>
+          </a:blip>
+          <a:stretch>
+            <a:fillRect/>
+          </a:stretch>
+        </p:blipFill>
+        <p:spPr>
+          <a:xfrm>
+            <a:off x="6993775" y="2435630"/>
+            <a:ext cx="4451645" cy="4093222"/>
+          </a:xfrm>
+          <a:prstGeom prst="rect">
+            <a:avLst/>
+          </a:prstGeom>
+        </p:spPr>
+      </p:pic>
       <p:sp>
         <p:nvSpPr>
           <p:cNvPr id="2" name="Título 1">
@@ -4245,6 +4281,45 @@
           </a:p>
         </p:txBody>
       </p:sp>
+      <p:sp>
+        <p:nvSpPr>
+          <p:cNvPr id="4" name="Marcador de contenido 3">
+            <a:extLst>
+              <a:ext uri="{FF2B5EF4-FFF2-40B4-BE49-F238E27FC236}">
+                <a16:creationId xmlns:a16="http://schemas.microsoft.com/office/drawing/2014/main" id="{341422D5-B491-4096-91E8-FC2A9CC0BF27}"/>
+              </a:ext>
+            </a:extLst>
+          </p:cNvPr>
+          <p:cNvSpPr>
+            <a:spLocks noGrp="1"/>
+          </p:cNvSpPr>
+          <p:nvPr>
+            <p:ph idx="1"/>
+          </p:nvPr>
+        </p:nvSpPr>
+        <p:spPr>
+          <a:xfrm>
+            <a:off x="6993775" y="1655214"/>
+            <a:ext cx="4360025" cy="1052512"/>
+          </a:xfrm>
+        </p:spPr>
+        <p:txBody>
+          <a:bodyPr>
+            <a:normAutofit/>
+          </a:bodyPr>
+          <a:lstStyle/>
+          <a:p>
+            <a:pPr marL="0" indent="0" algn="just">
+              <a:buNone/>
+            </a:pPr>
+            <a:r>
+              <a:rPr lang="es-MX" sz="1400" dirty="0"/>
+              <a:t>El agente genera contenido relacionado con los temas que el usuario está estudiando, adaptando la información para apoyar su proceso de aprendizaje de forma personalizada.</a:t>
+            </a:r>
+            <a:endParaRPr lang="es-CO" sz="1400" dirty="0"/>
+          </a:p>
+        </p:txBody>
+      </p:sp>
       <p:pic>
         <p:nvPicPr>
           <p:cNvPr id="7" name="Picture 6" descr="Microsoft | Microsoft Wiki | Fandom">
@@ -4260,7 +4335,7 @@
           <p:nvPr/>
         </p:nvPicPr>
         <p:blipFill>
-          <a:blip r:embed="rId2">
+          <a:blip r:embed="rId3">
             <a:extLst>
               <a:ext uri="{28A0092B-C50C-407E-A947-70E740481C1C}">
                 <a14:useLocalDpi xmlns:a14="http://schemas.microsoft.com/office/drawing/2010/main" val="0"/>
@@ -4307,7 +4382,7 @@
           <p:nvPr/>
         </p:nvPicPr>
         <p:blipFill>
-          <a:blip r:embed="rId3">
+          <a:blip r:embed="rId4">
             <a:extLst>
               <a:ext uri="{28A0092B-C50C-407E-A947-70E740481C1C}">
                 <a14:useLocalDpi xmlns:a14="http://schemas.microsoft.com/office/drawing/2010/main" val="0"/>
@@ -4341,45 +4416,6 @@
       </p:pic>
       <p:sp>
         <p:nvSpPr>
-          <p:cNvPr id="4" name="Marcador de contenido 3">
-            <a:extLst>
-              <a:ext uri="{FF2B5EF4-FFF2-40B4-BE49-F238E27FC236}">
-                <a16:creationId xmlns:a16="http://schemas.microsoft.com/office/drawing/2014/main" id="{341422D5-B491-4096-91E8-FC2A9CC0BF27}"/>
-              </a:ext>
-            </a:extLst>
-          </p:cNvPr>
-          <p:cNvSpPr>
-            <a:spLocks noGrp="1"/>
-          </p:cNvSpPr>
-          <p:nvPr>
-            <p:ph idx="1"/>
-          </p:nvPr>
-        </p:nvSpPr>
-        <p:spPr>
-          <a:xfrm>
-            <a:off x="6993775" y="1655214"/>
-            <a:ext cx="4360025" cy="1052512"/>
-          </a:xfrm>
-        </p:spPr>
-        <p:txBody>
-          <a:bodyPr>
-            <a:normAutofit/>
-          </a:bodyPr>
-          <a:lstStyle/>
-          <a:p>
-            <a:pPr marL="0" indent="0">
-              <a:buNone/>
-            </a:pPr>
-            <a:r>
-              <a:rPr lang="es-MX" sz="1400" dirty="0"/>
-              <a:t>El agente genera contenido relacionado con los temas que el usuario está estudiando, adaptando la información para apoyar su proceso de aprendizaje de forma personalizada.</a:t>
-            </a:r>
-            <a:endParaRPr lang="es-CO" sz="1400" dirty="0"/>
-          </a:p>
-        </p:txBody>
-      </p:sp>
-      <p:sp>
-        <p:nvSpPr>
           <p:cNvPr id="10" name="CuadroTexto 9">
             <a:extLst>
               <a:ext uri="{FF2B5EF4-FFF2-40B4-BE49-F238E27FC236}">
@@ -4406,7 +4442,7 @@
           </a:bodyPr>
           <a:lstStyle/>
           <a:p>
-            <a:pPr marL="285750" indent="-285750">
+            <a:pPr marL="285750" indent="-285750" algn="just">
               <a:buFont typeface="Arial" panose="020B0604020202020204" pitchFamily="34" charset="0"/>
               <a:buChar char="•"/>
             </a:pPr>
@@ -4420,14 +4456,14 @@
             </a:r>
           </a:p>
           <a:p>
-            <a:pPr marL="285750" indent="-285750">
+            <a:pPr marL="285750" indent="-285750" algn="just">
               <a:buFont typeface="Arial" panose="020B0604020202020204" pitchFamily="34" charset="0"/>
               <a:buChar char="•"/>
             </a:pPr>
             <a:endParaRPr lang="es-MX" sz="1400" dirty="0"/>
           </a:p>
           <a:p>
-            <a:pPr marL="285750" indent="-285750">
+            <a:pPr marL="285750" indent="-285750" algn="just">
               <a:buFont typeface="Arial" panose="020B0604020202020204" pitchFamily="34" charset="0"/>
               <a:buChar char="•"/>
             </a:pPr>
@@ -4445,14 +4481,14 @@
             </a:r>
           </a:p>
           <a:p>
-            <a:pPr marL="285750" indent="-285750">
+            <a:pPr marL="285750" indent="-285750" algn="just">
               <a:buFont typeface="Arial" panose="020B0604020202020204" pitchFamily="34" charset="0"/>
               <a:buChar char="•"/>
             </a:pPr>
             <a:endParaRPr lang="es-MX" sz="1400" dirty="0"/>
           </a:p>
           <a:p>
-            <a:pPr marL="285750" indent="-285750">
+            <a:pPr marL="285750" indent="-285750" algn="just">
               <a:buFont typeface="Arial" panose="020B0604020202020204" pitchFamily="34" charset="0"/>
               <a:buChar char="•"/>
             </a:pPr>
@@ -4470,14 +4506,14 @@
             </a:r>
           </a:p>
           <a:p>
-            <a:pPr marL="285750" indent="-285750">
+            <a:pPr marL="285750" indent="-285750" algn="just">
               <a:buFont typeface="Arial" panose="020B0604020202020204" pitchFamily="34" charset="0"/>
               <a:buChar char="•"/>
             </a:pPr>
             <a:endParaRPr lang="es-MX" sz="1400" dirty="0"/>
           </a:p>
           <a:p>
-            <a:pPr marL="285750" indent="-285750">
+            <a:pPr marL="285750" indent="-285750" algn="just">
               <a:buFont typeface="Arial" panose="020B0604020202020204" pitchFamily="34" charset="0"/>
               <a:buChar char="•"/>
             </a:pPr>
@@ -4495,14 +4531,14 @@
             </a:r>
           </a:p>
           <a:p>
-            <a:pPr marL="285750" indent="-285750">
+            <a:pPr marL="285750" indent="-285750" algn="just">
               <a:buFont typeface="Arial" panose="020B0604020202020204" pitchFamily="34" charset="0"/>
               <a:buChar char="•"/>
             </a:pPr>
             <a:endParaRPr lang="es-MX" sz="1400" dirty="0"/>
           </a:p>
           <a:p>
-            <a:pPr marL="285750" indent="-285750">
+            <a:pPr marL="285750" indent="-285750" algn="just">
               <a:buFont typeface="Arial" panose="020B0604020202020204" pitchFamily="34" charset="0"/>
               <a:buChar char="•"/>
             </a:pPr>
@@ -4522,42 +4558,6 @@
           </a:p>
         </p:txBody>
       </p:sp>
-      <p:pic>
-        <p:nvPicPr>
-          <p:cNvPr id="9" name="Marcador de contenido 4">
-            <a:extLst>
-              <a:ext uri="{FF2B5EF4-FFF2-40B4-BE49-F238E27FC236}">
-                <a16:creationId xmlns:a16="http://schemas.microsoft.com/office/drawing/2014/main" id="{38970A53-BB1C-4624-AD0F-E10D487662ED}"/>
-              </a:ext>
-            </a:extLst>
-          </p:cNvPr>
-          <p:cNvPicPr>
-            <a:picLocks noChangeAspect="1"/>
-          </p:cNvPicPr>
-          <p:nvPr/>
-        </p:nvPicPr>
-        <p:blipFill>
-          <a:blip r:embed="rId4">
-            <a:extLst>
-              <a:ext uri="{28A0092B-C50C-407E-A947-70E740481C1C}">
-                <a14:useLocalDpi xmlns:a14="http://schemas.microsoft.com/office/drawing/2010/main" val="0"/>
-              </a:ext>
-            </a:extLst>
-          </a:blip>
-          <a:stretch>
-            <a:fillRect/>
-          </a:stretch>
-        </p:blipFill>
-        <p:spPr>
-          <a:xfrm>
-            <a:off x="6993775" y="2435630"/>
-            <a:ext cx="4451645" cy="4093222"/>
-          </a:xfrm>
-          <a:prstGeom prst="rect">
-            <a:avLst/>
-          </a:prstGeom>
-        </p:spPr>
-      </p:pic>
     </p:spTree>
     <p:extLst>
       <p:ext uri="{BB962C8B-B14F-4D97-AF65-F5344CB8AC3E}">
@@ -4616,6 +4616,45 @@
           </a:p>
         </p:txBody>
       </p:sp>
+      <p:sp>
+        <p:nvSpPr>
+          <p:cNvPr id="4" name="Marcador de contenido 3">
+            <a:extLst>
+              <a:ext uri="{FF2B5EF4-FFF2-40B4-BE49-F238E27FC236}">
+                <a16:creationId xmlns:a16="http://schemas.microsoft.com/office/drawing/2014/main" id="{341422D5-B491-4096-91E8-FC2A9CC0BF27}"/>
+              </a:ext>
+            </a:extLst>
+          </p:cNvPr>
+          <p:cNvSpPr>
+            <a:spLocks noGrp="1"/>
+          </p:cNvSpPr>
+          <p:nvPr>
+            <p:ph idx="1"/>
+          </p:nvPr>
+        </p:nvSpPr>
+        <p:spPr>
+          <a:xfrm>
+            <a:off x="838200" y="1825625"/>
+            <a:ext cx="4360025" cy="1773786"/>
+          </a:xfrm>
+        </p:spPr>
+        <p:txBody>
+          <a:bodyPr>
+            <a:normAutofit/>
+          </a:bodyPr>
+          <a:lstStyle/>
+          <a:p>
+            <a:pPr marL="0" indent="0" algn="just">
+              <a:buNone/>
+            </a:pPr>
+            <a:r>
+              <a:rPr lang="es-MX" sz="1600" dirty="0"/>
+              <a:t>El agente proporciona retroalimentación al usuario sobre los resultados obtenidos tras completar el cuestionario, ayudándole a identificar áreas de mejora y ofreciendo sugerencias para optimizar el aprendizaje.</a:t>
+            </a:r>
+            <a:endParaRPr lang="es-CO" sz="1600" dirty="0"/>
+          </a:p>
+        </p:txBody>
+      </p:sp>
       <p:pic>
         <p:nvPicPr>
           <p:cNvPr id="7" name="Picture 6" descr="Microsoft | Microsoft Wiki | Fandom">
@@ -4712,45 +4751,6 @@
       </p:pic>
       <p:sp>
         <p:nvSpPr>
-          <p:cNvPr id="4" name="Marcador de contenido 3">
-            <a:extLst>
-              <a:ext uri="{FF2B5EF4-FFF2-40B4-BE49-F238E27FC236}">
-                <a16:creationId xmlns:a16="http://schemas.microsoft.com/office/drawing/2014/main" id="{341422D5-B491-4096-91E8-FC2A9CC0BF27}"/>
-              </a:ext>
-            </a:extLst>
-          </p:cNvPr>
-          <p:cNvSpPr>
-            <a:spLocks noGrp="1"/>
-          </p:cNvSpPr>
-          <p:nvPr>
-            <p:ph idx="1"/>
-          </p:nvPr>
-        </p:nvSpPr>
-        <p:spPr>
-          <a:xfrm>
-            <a:off x="838200" y="1825625"/>
-            <a:ext cx="4360025" cy="1773786"/>
-          </a:xfrm>
-        </p:spPr>
-        <p:txBody>
-          <a:bodyPr>
-            <a:normAutofit/>
-          </a:bodyPr>
-          <a:lstStyle/>
-          <a:p>
-            <a:pPr marL="0" indent="0">
-              <a:buNone/>
-            </a:pPr>
-            <a:r>
-              <a:rPr lang="es-MX" sz="1600" dirty="0"/>
-              <a:t>El agente proporciona retroalimentación al usuario sobre los resultados obtenidos tras completar el cuestionario, ayudándole a identificar áreas de mejora y ofreciendo sugerencias para optimizar el aprendizaje.</a:t>
-            </a:r>
-            <a:endParaRPr lang="es-CO" sz="1600" dirty="0"/>
-          </a:p>
-        </p:txBody>
-      </p:sp>
-      <p:sp>
-        <p:nvSpPr>
           <p:cNvPr id="10" name="CuadroTexto 9">
             <a:extLst>
               <a:ext uri="{FF2B5EF4-FFF2-40B4-BE49-F238E27FC236}">
@@ -4777,7 +4777,7 @@
           </a:bodyPr>
           <a:lstStyle/>
           <a:p>
-            <a:pPr marL="285750" indent="-285750">
+            <a:pPr marL="285750" indent="-285750" algn="just">
               <a:buFont typeface="Arial" panose="020B0604020202020204" pitchFamily="34" charset="0"/>
               <a:buChar char="•"/>
             </a:pPr>
@@ -4915,8 +4915,8 @@
         </p:blipFill>
         <p:spPr>
           <a:xfrm>
-            <a:off x="2731729" y="1539926"/>
-            <a:ext cx="6728540" cy="5158778"/>
+            <a:off x="3258298" y="1825625"/>
+            <a:ext cx="5675404" cy="4351338"/>
           </a:xfrm>
         </p:spPr>
       </p:pic>
@@ -5667,6 +5667,7 @@
           </a:bodyPr>
           <a:lstStyle/>
           <a:p>
+            <a:pPr algn="just"/>
             <a:r>
               <a:rPr lang="es-MX" dirty="0"/>
               <a:t>Representa un curso en línea con información como título, instructor, URL y calificación.</a:t>
@@ -5703,6 +5704,7 @@
           </a:bodyPr>
           <a:lstStyle/>
           <a:p>
+            <a:pPr algn="just"/>
             <a:r>
               <a:rPr lang="es-MX" dirty="0"/>
               <a:t>Contiene una lista de preguntas de evaluación asociadas a un curso y un tema específico.</a:t>
@@ -5895,7 +5897,7 @@
           </a:bodyPr>
           <a:lstStyle/>
           <a:p>
-            <a:pPr algn="ctr"/>
+            <a:pPr algn="just"/>
             <a:r>
               <a:rPr lang="es-CO" sz="1000" b="1" dirty="0"/>
               <a:t>Equidad:</a:t>
@@ -5943,7 +5945,7 @@
           </a:bodyPr>
           <a:lstStyle/>
           <a:p>
-            <a:pPr algn="ctr"/>
+            <a:pPr algn="just"/>
             <a:r>
               <a:rPr lang="es-CO" sz="1000" b="1" dirty="0"/>
               <a:t>Confiabilidad y seguridad: </a:t>
@@ -5987,7 +5989,7 @@
           </a:bodyPr>
           <a:lstStyle/>
           <a:p>
-            <a:pPr algn="ctr"/>
+            <a:pPr algn="just"/>
             <a:r>
               <a:rPr lang="es-MX" sz="1000" b="1" dirty="0"/>
               <a:t>Privacidad y seguridad de datos: </a:t>
@@ -6031,7 +6033,7 @@
           </a:bodyPr>
           <a:lstStyle/>
           <a:p>
-            <a:pPr algn="ctr"/>
+            <a:pPr algn="just"/>
             <a:r>
               <a:rPr lang="es-CO" sz="1000" b="1" dirty="0"/>
               <a:t>Inclusión: </a:t>
@@ -6283,100 +6285,6 @@
       </p:sp>
       <p:pic>
         <p:nvPicPr>
-          <p:cNvPr id="4" name="Picture 6" descr="Microsoft | Microsoft Wiki | Fandom">
-            <a:extLst>
-              <a:ext uri="{FF2B5EF4-FFF2-40B4-BE49-F238E27FC236}">
-                <a16:creationId xmlns:a16="http://schemas.microsoft.com/office/drawing/2014/main" id="{6DBF9A4A-E0FC-4988-AA4C-78F7031B7BA6}"/>
-              </a:ext>
-            </a:extLst>
-          </p:cNvPr>
-          <p:cNvPicPr>
-            <a:picLocks noChangeAspect="1" noChangeArrowheads="1"/>
-          </p:cNvPicPr>
-          <p:nvPr/>
-        </p:nvPicPr>
-        <p:blipFill>
-          <a:blip r:embed="rId2">
-            <a:extLst>
-              <a:ext uri="{28A0092B-C50C-407E-A947-70E740481C1C}">
-                <a14:useLocalDpi xmlns:a14="http://schemas.microsoft.com/office/drawing/2010/main" val="0"/>
-              </a:ext>
-            </a:extLst>
-          </a:blip>
-          <a:srcRect/>
-          <a:stretch>
-            <a:fillRect/>
-          </a:stretch>
-        </p:blipFill>
-        <p:spPr bwMode="auto">
-          <a:xfrm>
-            <a:off x="114300" y="6389241"/>
-            <a:ext cx="1583837" cy="408501"/>
-          </a:xfrm>
-          <a:prstGeom prst="rect">
-            <a:avLst/>
-          </a:prstGeom>
-          <a:noFill/>
-          <a:extLst>
-            <a:ext uri="{909E8E84-426E-40DD-AFC4-6F175D3DCCD1}">
-              <a14:hiddenFill xmlns:a14="http://schemas.microsoft.com/office/drawing/2010/main">
-                <a:solidFill>
-                  <a:srgbClr val="FFFFFF"/>
-                </a:solidFill>
-              </a14:hiddenFill>
-            </a:ext>
-          </a:extLst>
-        </p:spPr>
-      </p:pic>
-      <p:pic>
-        <p:nvPicPr>
-          <p:cNvPr id="5" name="Picture 4" descr="Logo de Código Facilito">
-            <a:extLst>
-              <a:ext uri="{FF2B5EF4-FFF2-40B4-BE49-F238E27FC236}">
-                <a16:creationId xmlns:a16="http://schemas.microsoft.com/office/drawing/2014/main" id="{D3F29ABD-2778-4481-A95D-3AFE647D0A19}"/>
-              </a:ext>
-            </a:extLst>
-          </p:cNvPr>
-          <p:cNvPicPr>
-            <a:picLocks noChangeAspect="1" noChangeArrowheads="1"/>
-          </p:cNvPicPr>
-          <p:nvPr/>
-        </p:nvPicPr>
-        <p:blipFill>
-          <a:blip r:embed="rId3">
-            <a:extLst>
-              <a:ext uri="{28A0092B-C50C-407E-A947-70E740481C1C}">
-                <a14:useLocalDpi xmlns:a14="http://schemas.microsoft.com/office/drawing/2010/main" val="0"/>
-              </a:ext>
-            </a:extLst>
-          </a:blip>
-          <a:srcRect/>
-          <a:stretch>
-            <a:fillRect/>
-          </a:stretch>
-        </p:blipFill>
-        <p:spPr bwMode="auto">
-          <a:xfrm>
-            <a:off x="1816940" y="6419523"/>
-            <a:ext cx="2212135" cy="347935"/>
-          </a:xfrm>
-          <a:prstGeom prst="rect">
-            <a:avLst/>
-          </a:prstGeom>
-          <a:noFill/>
-          <a:extLst>
-            <a:ext uri="{909E8E84-426E-40DD-AFC4-6F175D3DCCD1}">
-              <a14:hiddenFill xmlns:a14="http://schemas.microsoft.com/office/drawing/2010/main">
-                <a:solidFill>
-                  <a:srgbClr val="FFFFFF"/>
-                </a:solidFill>
-              </a14:hiddenFill>
-            </a:ext>
-          </a:extLst>
-        </p:spPr>
-      </p:pic>
-      <p:pic>
-        <p:nvPicPr>
           <p:cNvPr id="4098" name="Picture 2">
             <a:extLst>
               <a:ext uri="{FF2B5EF4-FFF2-40B4-BE49-F238E27FC236}">
@@ -6392,7 +6300,7 @@
           </p:nvPr>
         </p:nvPicPr>
         <p:blipFill rotWithShape="1">
-          <a:blip r:embed="rId4">
+          <a:blip r:embed="rId2">
             <a:extLst>
               <a:ext uri="{28A0092B-C50C-407E-A947-70E740481C1C}">
                 <a14:useLocalDpi xmlns:a14="http://schemas.microsoft.com/office/drawing/2010/main" val="0"/>
@@ -6434,6 +6342,100 @@
           </a:extLst>
         </p:spPr>
       </p:pic>
+      <p:pic>
+        <p:nvPicPr>
+          <p:cNvPr id="4" name="Picture 6" descr="Microsoft | Microsoft Wiki | Fandom">
+            <a:extLst>
+              <a:ext uri="{FF2B5EF4-FFF2-40B4-BE49-F238E27FC236}">
+                <a16:creationId xmlns:a16="http://schemas.microsoft.com/office/drawing/2014/main" id="{6DBF9A4A-E0FC-4988-AA4C-78F7031B7BA6}"/>
+              </a:ext>
+            </a:extLst>
+          </p:cNvPr>
+          <p:cNvPicPr>
+            <a:picLocks noChangeAspect="1" noChangeArrowheads="1"/>
+          </p:cNvPicPr>
+          <p:nvPr/>
+        </p:nvPicPr>
+        <p:blipFill>
+          <a:blip r:embed="rId3">
+            <a:extLst>
+              <a:ext uri="{28A0092B-C50C-407E-A947-70E740481C1C}">
+                <a14:useLocalDpi xmlns:a14="http://schemas.microsoft.com/office/drawing/2010/main" val="0"/>
+              </a:ext>
+            </a:extLst>
+          </a:blip>
+          <a:srcRect/>
+          <a:stretch>
+            <a:fillRect/>
+          </a:stretch>
+        </p:blipFill>
+        <p:spPr bwMode="auto">
+          <a:xfrm>
+            <a:off x="114300" y="6389241"/>
+            <a:ext cx="1583837" cy="408501"/>
+          </a:xfrm>
+          <a:prstGeom prst="rect">
+            <a:avLst/>
+          </a:prstGeom>
+          <a:noFill/>
+          <a:extLst>
+            <a:ext uri="{909E8E84-426E-40DD-AFC4-6F175D3DCCD1}">
+              <a14:hiddenFill xmlns:a14="http://schemas.microsoft.com/office/drawing/2010/main">
+                <a:solidFill>
+                  <a:srgbClr val="FFFFFF"/>
+                </a:solidFill>
+              </a14:hiddenFill>
+            </a:ext>
+          </a:extLst>
+        </p:spPr>
+      </p:pic>
+      <p:pic>
+        <p:nvPicPr>
+          <p:cNvPr id="5" name="Picture 4" descr="Logo de Código Facilito">
+            <a:extLst>
+              <a:ext uri="{FF2B5EF4-FFF2-40B4-BE49-F238E27FC236}">
+                <a16:creationId xmlns:a16="http://schemas.microsoft.com/office/drawing/2014/main" id="{D3F29ABD-2778-4481-A95D-3AFE647D0A19}"/>
+              </a:ext>
+            </a:extLst>
+          </p:cNvPr>
+          <p:cNvPicPr>
+            <a:picLocks noChangeAspect="1" noChangeArrowheads="1"/>
+          </p:cNvPicPr>
+          <p:nvPr/>
+        </p:nvPicPr>
+        <p:blipFill>
+          <a:blip r:embed="rId4">
+            <a:extLst>
+              <a:ext uri="{28A0092B-C50C-407E-A947-70E740481C1C}">
+                <a14:useLocalDpi xmlns:a14="http://schemas.microsoft.com/office/drawing/2010/main" val="0"/>
+              </a:ext>
+            </a:extLst>
+          </a:blip>
+          <a:srcRect/>
+          <a:stretch>
+            <a:fillRect/>
+          </a:stretch>
+        </p:blipFill>
+        <p:spPr bwMode="auto">
+          <a:xfrm>
+            <a:off x="1816940" y="6419523"/>
+            <a:ext cx="2212135" cy="347935"/>
+          </a:xfrm>
+          <a:prstGeom prst="rect">
+            <a:avLst/>
+          </a:prstGeom>
+          <a:noFill/>
+          <a:extLst>
+            <a:ext uri="{909E8E84-426E-40DD-AFC4-6F175D3DCCD1}">
+              <a14:hiddenFill xmlns:a14="http://schemas.microsoft.com/office/drawing/2010/main">
+                <a:solidFill>
+                  <a:srgbClr val="FFFFFF"/>
+                </a:solidFill>
+              </a14:hiddenFill>
+            </a:ext>
+          </a:extLst>
+        </p:spPr>
+      </p:pic>
       <p:sp>
         <p:nvSpPr>
           <p:cNvPr id="7" name="CuadroTexto 6">
@@ -6462,7 +6464,7 @@
           </a:bodyPr>
           <a:lstStyle/>
           <a:p>
-            <a:pPr algn="ctr"/>
+            <a:pPr algn="just"/>
             <a:r>
               <a:rPr lang="es-CO" sz="1000" b="1" dirty="0"/>
               <a:t>Transparencia: </a:t>
@@ -6506,7 +6508,7 @@
           </a:bodyPr>
           <a:lstStyle/>
           <a:p>
-            <a:pPr algn="ctr"/>
+            <a:pPr algn="just"/>
             <a:r>
               <a:rPr lang="es-CO" sz="1000" b="1" dirty="0"/>
               <a:t>Responsabilidad: </a:t>
@@ -6590,6 +6592,62 @@
       </p:sp>
       <p:sp>
         <p:nvSpPr>
+          <p:cNvPr id="11" name="Marcador de contenido 10">
+            <a:extLst>
+              <a:ext uri="{FF2B5EF4-FFF2-40B4-BE49-F238E27FC236}">
+                <a16:creationId xmlns:a16="http://schemas.microsoft.com/office/drawing/2014/main" id="{078ABF1B-8935-42DC-9A3B-1D2061EEB01F}"/>
+              </a:ext>
+            </a:extLst>
+          </p:cNvPr>
+          <p:cNvSpPr>
+            <a:spLocks noGrp="1"/>
+          </p:cNvSpPr>
+          <p:nvPr>
+            <p:ph sz="half" idx="2"/>
+          </p:nvPr>
+        </p:nvSpPr>
+        <p:spPr>
+          <a:xfrm>
+            <a:off x="2755094" y="2535129"/>
+            <a:ext cx="2315095" cy="461307"/>
+          </a:xfrm>
+        </p:spPr>
+        <p:txBody>
+          <a:bodyPr>
+            <a:normAutofit fontScale="25000" lnSpcReduction="20000"/>
+          </a:bodyPr>
+          <a:lstStyle/>
+          <a:p>
+            <a:pPr marL="0" indent="0">
+              <a:buNone/>
+            </a:pPr>
+            <a:r>
+              <a:rPr lang="es-CO" sz="7200" b="1" i="0" dirty="0">
+                <a:solidFill>
+                  <a:srgbClr val="3C4043"/>
+                </a:solidFill>
+                <a:effectLst/>
+              </a:rPr>
+              <a:t>Daniela Vallejo</a:t>
+            </a:r>
+          </a:p>
+          <a:p>
+            <a:pPr marL="0" indent="0">
+              <a:buNone/>
+            </a:pPr>
+            <a:r>
+              <a:rPr lang="es-CO" sz="5600" i="1" dirty="0">
+                <a:solidFill>
+                  <a:srgbClr val="3C4043"/>
+                </a:solidFill>
+              </a:rPr>
+              <a:t>ML Engineer</a:t>
+            </a:r>
+          </a:p>
+        </p:txBody>
+      </p:sp>
+      <p:sp>
+        <p:nvSpPr>
           <p:cNvPr id="10" name="Marcador de texto 9">
             <a:extLst>
               <a:ext uri="{FF2B5EF4-FFF2-40B4-BE49-F238E27FC236}">
@@ -6621,62 +6679,6 @@
               <a:t>Advisors</a:t>
             </a:r>
             <a:endParaRPr lang="es-CO" sz="4400" dirty="0"/>
-          </a:p>
-        </p:txBody>
-      </p:sp>
-      <p:sp>
-        <p:nvSpPr>
-          <p:cNvPr id="11" name="Marcador de contenido 10">
-            <a:extLst>
-              <a:ext uri="{FF2B5EF4-FFF2-40B4-BE49-F238E27FC236}">
-                <a16:creationId xmlns:a16="http://schemas.microsoft.com/office/drawing/2014/main" id="{078ABF1B-8935-42DC-9A3B-1D2061EEB01F}"/>
-              </a:ext>
-            </a:extLst>
-          </p:cNvPr>
-          <p:cNvSpPr>
-            <a:spLocks noGrp="1"/>
-          </p:cNvSpPr>
-          <p:nvPr>
-            <p:ph sz="quarter" idx="4"/>
-          </p:nvPr>
-        </p:nvSpPr>
-        <p:spPr>
-          <a:xfrm>
-            <a:off x="2755094" y="2535129"/>
-            <a:ext cx="2315095" cy="461307"/>
-          </a:xfrm>
-        </p:spPr>
-        <p:txBody>
-          <a:bodyPr>
-            <a:normAutofit fontScale="25000" lnSpcReduction="20000"/>
-          </a:bodyPr>
-          <a:lstStyle/>
-          <a:p>
-            <a:pPr marL="0" indent="0">
-              <a:buNone/>
-            </a:pPr>
-            <a:r>
-              <a:rPr lang="es-CO" sz="7200" b="1" i="0" dirty="0">
-                <a:solidFill>
-                  <a:srgbClr val="3C4043"/>
-                </a:solidFill>
-                <a:effectLst/>
-              </a:rPr>
-              <a:t>Daniela Vallejo</a:t>
-            </a:r>
-          </a:p>
-          <a:p>
-            <a:pPr marL="0" indent="0">
-              <a:buNone/>
-            </a:pPr>
-            <a:r>
-              <a:rPr lang="es-CO" sz="5600" i="1" dirty="0">
-                <a:solidFill>
-                  <a:srgbClr val="3C4043"/>
-                </a:solidFill>
-              </a:rPr>
-              <a:t>ML Engineer</a:t>
-            </a:r>
           </a:p>
         </p:txBody>
       </p:sp>
@@ -8455,6 +8457,7 @@
           </a:bodyPr>
           <a:lstStyle/>
           <a:p>
+            <a:pPr algn="just"/>
             <a:r>
               <a:rPr lang="es-MX" sz="2000" dirty="0">
                 <a:ea typeface="+mn-lt"/>
@@ -8470,6 +8473,7 @@
             </a:endParaRPr>
           </a:p>
           <a:p>
+            <a:pPr algn="just"/>
             <a:r>
               <a:rPr lang="es-MX" sz="2000" dirty="0">
                 <a:ea typeface="+mn-lt"/>
@@ -8633,7 +8637,7 @@
           </a:bodyPr>
           <a:lstStyle/>
           <a:p>
-            <a:pPr algn="ctr"/>
+            <a:pPr algn="just"/>
             <a:r>
               <a:rPr lang="es-MX" sz="1400" dirty="0">
                 <a:ea typeface="+mn-lt"/>
@@ -8676,7 +8680,7 @@
           </a:bodyPr>
           <a:lstStyle/>
           <a:p>
-            <a:pPr marL="342900" indent="-342900" algn="ctr">
+            <a:pPr marL="342900" indent="-342900" algn="just">
               <a:buClr>
                 <a:srgbClr val="FFFFFF"/>
               </a:buClr>
@@ -8720,7 +8724,7 @@
           </a:bodyPr>
           <a:lstStyle/>
           <a:p>
-            <a:pPr marL="342900" indent="-342900" algn="ctr">
+            <a:pPr marL="342900" indent="-342900" algn="just">
               <a:buClr>
                 <a:srgbClr val="FFFFFF"/>
               </a:buClr>
@@ -9170,7 +9174,7 @@
         </p:blipFill>
         <p:spPr bwMode="auto">
           <a:xfrm>
-            <a:off x="4256806" y="1285476"/>
+            <a:off x="4694463" y="1283438"/>
             <a:ext cx="2803074" cy="2803074"/>
           </a:xfrm>
           <a:prstGeom prst="rect">
@@ -9202,7 +9206,7 @@
         </p:nvSpPr>
         <p:spPr>
           <a:xfrm>
-            <a:off x="130630" y="3429000"/>
+            <a:off x="8502346" y="3429000"/>
             <a:ext cx="2931886" cy="1384995"/>
           </a:xfrm>
           <a:prstGeom prst="rect">
@@ -9216,7 +9220,7 @@
           </a:bodyPr>
           <a:lstStyle/>
           <a:p>
-            <a:pPr algn="ctr"/>
+            <a:pPr algn="just"/>
             <a:r>
               <a:rPr lang="es-MX" sz="1400" dirty="0">
                 <a:ea typeface="+mn-lt"/>
@@ -9241,7 +9245,7 @@
         </p:nvSpPr>
         <p:spPr>
           <a:xfrm>
-            <a:off x="8694056" y="3428563"/>
+            <a:off x="508445" y="3426093"/>
             <a:ext cx="3367314" cy="1169551"/>
           </a:xfrm>
           <a:prstGeom prst="rect">
@@ -9255,7 +9259,7 @@
           </a:bodyPr>
           <a:lstStyle/>
           <a:p>
-            <a:pPr algn="ctr">
+            <a:pPr algn="just">
               <a:buClr>
                 <a:srgbClr val="FFFFFF"/>
               </a:buClr>
@@ -9284,7 +9288,7 @@
         </p:nvSpPr>
         <p:spPr>
           <a:xfrm>
-            <a:off x="3884595" y="5634720"/>
+            <a:off x="4322252" y="5424777"/>
             <a:ext cx="3547494" cy="1169551"/>
           </a:xfrm>
           <a:prstGeom prst="rect">
@@ -9298,7 +9302,7 @@
           </a:bodyPr>
           <a:lstStyle/>
           <a:p>
-            <a:pPr algn="ctr">
+            <a:pPr algn="just">
               <a:buClr>
                 <a:srgbClr val="FFFFFF"/>
               </a:buClr>
@@ -9436,7 +9440,7 @@
         </p:blipFill>
         <p:spPr bwMode="auto">
           <a:xfrm>
-            <a:off x="9609321" y="1782577"/>
+            <a:off x="1229548" y="1819501"/>
             <a:ext cx="1536783" cy="1536783"/>
           </a:xfrm>
           <a:prstGeom prst="rect">
@@ -9483,7 +9487,7 @@
         </p:blipFill>
         <p:spPr bwMode="auto">
           <a:xfrm>
-            <a:off x="952178" y="1782577"/>
+            <a:off x="9254781" y="1846411"/>
             <a:ext cx="1491917" cy="1509873"/>
           </a:xfrm>
           <a:prstGeom prst="rect">
@@ -9528,7 +9532,7 @@
         </p:blipFill>
         <p:spPr bwMode="auto">
           <a:xfrm>
-            <a:off x="4889404" y="4121497"/>
+            <a:off x="5327061" y="3843614"/>
             <a:ext cx="1537877" cy="1509873"/>
           </a:xfrm>
           <a:prstGeom prst="rect">
@@ -9574,7 +9578,7 @@
         </p:blipFill>
         <p:spPr>
           <a:xfrm>
-            <a:off x="4875227" y="1838729"/>
+            <a:off x="5209158" y="1838729"/>
             <a:ext cx="1773684" cy="1696567"/>
           </a:xfrm>
           <a:prstGeom prst="rect">
@@ -9582,6 +9586,36 @@
           </a:prstGeom>
         </p:spPr>
       </p:pic>
+      <p:sp>
+        <p:nvSpPr>
+          <p:cNvPr id="4" name="Título 3">
+            <a:extLst>
+              <a:ext uri="{FF2B5EF4-FFF2-40B4-BE49-F238E27FC236}">
+                <a16:creationId xmlns:a16="http://schemas.microsoft.com/office/drawing/2014/main" id="{712CD156-662B-43C7-AE95-C233A42199A9}"/>
+              </a:ext>
+            </a:extLst>
+          </p:cNvPr>
+          <p:cNvSpPr>
+            <a:spLocks noGrp="1"/>
+          </p:cNvSpPr>
+          <p:nvPr>
+            <p:ph type="title"/>
+          </p:nvPr>
+        </p:nvSpPr>
+        <p:spPr/>
+        <p:txBody>
+          <a:bodyPr/>
+          <a:lstStyle/>
+          <a:p>
+            <a:pPr algn="ctr"/>
+            <a:r>
+              <a:rPr lang="en-US" dirty="0"/>
+              <a:t>Funcionalidades</a:t>
+            </a:r>
+            <a:endParaRPr lang="es-CO" dirty="0"/>
+          </a:p>
+        </p:txBody>
+      </p:sp>
     </p:spTree>
     <p:extLst>
       <p:ext uri="{BB962C8B-B14F-4D97-AF65-F5344CB8AC3E}">
@@ -9763,7 +9797,7 @@
           </a:bodyPr>
           <a:lstStyle/>
           <a:p>
-            <a:pPr algn="ctr"/>
+            <a:pPr algn="just"/>
             <a:r>
               <a:rPr lang="es-MX" sz="1200" dirty="0">
                 <a:ea typeface="+mn-lt"/>
@@ -9802,7 +9836,7 @@
           </a:bodyPr>
           <a:lstStyle/>
           <a:p>
-            <a:pPr algn="ctr"/>
+            <a:pPr algn="just"/>
             <a:r>
               <a:rPr lang="es-MX" sz="1200" dirty="0">
                 <a:ea typeface="+mn-lt"/>
@@ -9841,7 +9875,7 @@
           </a:bodyPr>
           <a:lstStyle/>
           <a:p>
-            <a:pPr algn="ctr"/>
+            <a:pPr algn="just"/>
             <a:r>
               <a:rPr lang="es-MX" sz="1200" dirty="0">
                 <a:ea typeface="+mn-lt"/>
@@ -9910,7 +9944,7 @@
           </a:bodyPr>
           <a:lstStyle/>
           <a:p>
-            <a:pPr algn="ctr"/>
+            <a:pPr algn="just"/>
             <a:r>
               <a:rPr lang="es-MX" sz="1200" dirty="0">
                 <a:ea typeface="+mn-lt"/>
@@ -9949,7 +9983,7 @@
           </a:bodyPr>
           <a:lstStyle/>
           <a:p>
-            <a:pPr algn="ctr"/>
+            <a:pPr algn="just"/>
             <a:r>
               <a:rPr lang="es-MX" sz="1200" dirty="0">
                 <a:ea typeface="+mn-lt"/>
@@ -10347,8 +10381,8 @@
         </p:blipFill>
         <p:spPr>
           <a:xfrm>
-            <a:off x="2839058" y="1541058"/>
-            <a:ext cx="6513883" cy="5030026"/>
+            <a:off x="2747285" y="820071"/>
+            <a:ext cx="7476577" cy="5773419"/>
           </a:xfrm>
         </p:spPr>
       </p:pic>
@@ -10528,13 +10562,13 @@
             <a:spLocks noGrp="1"/>
           </p:cNvSpPr>
           <p:nvPr>
-            <p:ph type="title" idx="4294967295"/>
+            <p:ph type="title"/>
           </p:nvPr>
         </p:nvSpPr>
         <p:spPr>
           <a:xfrm>
-            <a:off x="159656" y="2201238"/>
-            <a:ext cx="3492922" cy="2455523"/>
+            <a:off x="114300" y="365126"/>
+            <a:ext cx="11963400" cy="475286"/>
           </a:xfrm>
         </p:spPr>
         <p:txBody>
@@ -10545,7 +10579,7 @@
           <a:p>
             <a:pPr algn="ctr"/>
             <a:r>
-              <a:rPr lang="es-CO" b="0" i="0" dirty="0">
+              <a:rPr lang="es-CO" sz="4000" b="0" i="0" dirty="0">
                 <a:solidFill>
                   <a:srgbClr val="27262B"/>
                 </a:solidFill>
@@ -10553,7 +10587,7 @@
               </a:rPr>
               <a:t>El modelo C4 para visualizar la arquitectura de software.</a:t>
             </a:r>
-            <a:endParaRPr lang="es-CO" dirty="0"/>
+            <a:endParaRPr lang="es-CO" sz="4000" dirty="0"/>
           </a:p>
         </p:txBody>
       </p:sp>
@@ -10573,7 +10607,7 @@
         </p:nvSpPr>
         <p:spPr>
           <a:xfrm>
-            <a:off x="5801689" y="6419523"/>
+            <a:off x="8714355" y="6419523"/>
             <a:ext cx="3363345" cy="475286"/>
           </a:xfrm>
           <a:prstGeom prst="rect">
@@ -10716,10 +10750,10 @@
       </p:pic>
       <p:pic>
         <p:nvPicPr>
-          <p:cNvPr id="4" name="Imagen 3" descr="Diagrama&#10;&#10;Descripción generada automáticamente">
-            <a:extLst>
-              <a:ext uri="{FF2B5EF4-FFF2-40B4-BE49-F238E27FC236}">
-                <a16:creationId xmlns:a16="http://schemas.microsoft.com/office/drawing/2014/main" id="{A86574F1-CB5D-4C05-B993-E836F7B7F8FD}"/>
+          <p:cNvPr id="5" name="Imagen 4">
+            <a:extLst>
+              <a:ext uri="{FF2B5EF4-FFF2-40B4-BE49-F238E27FC236}">
+                <a16:creationId xmlns:a16="http://schemas.microsoft.com/office/drawing/2014/main" id="{A47A2451-7C50-44E8-BB69-BF3498168B36}"/>
               </a:ext>
             </a:extLst>
           </p:cNvPr>
@@ -10729,21 +10763,15 @@
           <p:nvPr/>
         </p:nvPicPr>
         <p:blipFill>
-          <a:blip r:embed="rId4">
-            <a:extLst>
-              <a:ext uri="{28A0092B-C50C-407E-A947-70E740481C1C}">
-                <a14:useLocalDpi xmlns:a14="http://schemas.microsoft.com/office/drawing/2010/main" val="0"/>
-              </a:ext>
-            </a:extLst>
-          </a:blip>
+          <a:blip r:embed="rId4"/>
           <a:stretch>
             <a:fillRect/>
           </a:stretch>
         </p:blipFill>
         <p:spPr>
           <a:xfrm>
-            <a:off x="3652578" y="1724025"/>
-            <a:ext cx="7661568" cy="4695498"/>
+            <a:off x="974931" y="840412"/>
+            <a:ext cx="9945617" cy="5548993"/>
           </a:xfrm>
           <a:prstGeom prst="rect">
             <a:avLst/>
@@ -10796,9 +10824,16 @@
             <p:ph type="title"/>
           </p:nvPr>
         </p:nvSpPr>
-        <p:spPr/>
-        <p:txBody>
-          <a:bodyPr/>
+        <p:spPr>
+          <a:xfrm>
+            <a:off x="838200" y="365125"/>
+            <a:ext cx="10515600" cy="514441"/>
+          </a:xfrm>
+        </p:spPr>
+        <p:txBody>
+          <a:bodyPr>
+            <a:normAutofit fontScale="90000"/>
+          </a:bodyPr>
           <a:lstStyle/>
           <a:p>
             <a:r>
@@ -10810,10 +10845,10 @@
       </p:sp>
       <p:pic>
         <p:nvPicPr>
-          <p:cNvPr id="5" name="Marcador de contenido 4" descr="Diagrama&#10;&#10;Descripción generada automáticamente">
-            <a:extLst>
-              <a:ext uri="{FF2B5EF4-FFF2-40B4-BE49-F238E27FC236}">
-                <a16:creationId xmlns:a16="http://schemas.microsoft.com/office/drawing/2014/main" id="{0BF3B38B-D85B-4B33-B2B0-51D38F1B3253}"/>
+          <p:cNvPr id="9" name="Marcador de contenido 8">
+            <a:extLst>
+              <a:ext uri="{FF2B5EF4-FFF2-40B4-BE49-F238E27FC236}">
+                <a16:creationId xmlns:a16="http://schemas.microsoft.com/office/drawing/2014/main" id="{E97707A7-79E1-4E8B-BCF9-DA7BE024EFBF}"/>
               </a:ext>
             </a:extLst>
           </p:cNvPr>
@@ -10825,21 +10860,15 @@
           </p:nvPr>
         </p:nvPicPr>
         <p:blipFill>
-          <a:blip r:embed="rId2">
-            <a:extLst>
-              <a:ext uri="{28A0092B-C50C-407E-A947-70E740481C1C}">
-                <a14:useLocalDpi xmlns:a14="http://schemas.microsoft.com/office/drawing/2010/main" val="0"/>
-              </a:ext>
-            </a:extLst>
-          </a:blip>
+          <a:blip r:embed="rId2"/>
           <a:stretch>
             <a:fillRect/>
           </a:stretch>
         </p:blipFill>
         <p:spPr>
           <a:xfrm>
-            <a:off x="1643768" y="1690688"/>
-            <a:ext cx="9180593" cy="4614862"/>
+            <a:off x="386280" y="882054"/>
+            <a:ext cx="11419439" cy="5507187"/>
           </a:xfrm>
         </p:spPr>
       </p:pic>

</xml_diff>